<commit_message>
Added homework 1 items
</commit_message>
<xml_diff>
--- a/Documents/Proposal Presentation.pptx
+++ b/Documents/Proposal Presentation.pptx
@@ -110,6 +110,11 @@
       </a:defRPr>
     </a:lvl9pPr>
   </p:defaultTextStyle>
+  <p:extLst>
+    <p:ext uri="{EFAFB233-063F-42B5-8137-9DF3F51BA10A}">
+      <p15:sldGuideLst xmlns:p15="http://schemas.microsoft.com/office/powerpoint/2012/main"/>
+    </p:ext>
+  </p:extLst>
 </p:presentation>
 </file>
 
@@ -339,7 +344,7 @@
           <a:p>
             <a:fld id="{74AFDC4B-264C-476A-8687-5351AC00FB2C}" type="datetimeFigureOut">
               <a:rPr lang="en-US" smtClean="0"/>
-              <a:t>1/22/2019</a:t>
+              <a:t>1/23/2019</a:t>
             </a:fld>
             <a:endParaRPr lang="en-US"/>
           </a:p>
@@ -547,7 +552,7 @@
           <a:p>
             <a:fld id="{74AFDC4B-264C-476A-8687-5351AC00FB2C}" type="datetimeFigureOut">
               <a:rPr lang="en-US" smtClean="0"/>
-              <a:t>1/22/2019</a:t>
+              <a:t>1/23/2019</a:t>
             </a:fld>
             <a:endParaRPr lang="en-US"/>
           </a:p>
@@ -803,7 +808,7 @@
           <a:p>
             <a:fld id="{74AFDC4B-264C-476A-8687-5351AC00FB2C}" type="datetimeFigureOut">
               <a:rPr lang="en-US" smtClean="0"/>
-              <a:t>1/22/2019</a:t>
+              <a:t>1/23/2019</a:t>
             </a:fld>
             <a:endParaRPr lang="en-US"/>
           </a:p>
@@ -977,7 +982,7 @@
           <a:p>
             <a:fld id="{74AFDC4B-264C-476A-8687-5351AC00FB2C}" type="datetimeFigureOut">
               <a:rPr lang="en-US" smtClean="0"/>
-              <a:t>1/22/2019</a:t>
+              <a:t>1/23/2019</a:t>
             </a:fld>
             <a:endParaRPr lang="en-US"/>
           </a:p>
@@ -1320,7 +1325,7 @@
           <a:p>
             <a:fld id="{74AFDC4B-264C-476A-8687-5351AC00FB2C}" type="datetimeFigureOut">
               <a:rPr lang="en-US" smtClean="0"/>
-              <a:t>1/22/2019</a:t>
+              <a:t>1/23/2019</a:t>
             </a:fld>
             <a:endParaRPr lang="en-US"/>
           </a:p>
@@ -1595,7 +1600,7 @@
           <a:p>
             <a:fld id="{74AFDC4B-264C-476A-8687-5351AC00FB2C}" type="datetimeFigureOut">
               <a:rPr lang="en-US" smtClean="0"/>
-              <a:t>1/22/2019</a:t>
+              <a:t>1/23/2019</a:t>
             </a:fld>
             <a:endParaRPr lang="en-US"/>
           </a:p>
@@ -1974,7 +1979,7 @@
           <a:p>
             <a:fld id="{74AFDC4B-264C-476A-8687-5351AC00FB2C}" type="datetimeFigureOut">
               <a:rPr lang="en-US" smtClean="0"/>
-              <a:t>1/22/2019</a:t>
+              <a:t>1/23/2019</a:t>
             </a:fld>
             <a:endParaRPr lang="en-US"/>
           </a:p>
@@ -2092,7 +2097,7 @@
           <a:p>
             <a:fld id="{74AFDC4B-264C-476A-8687-5351AC00FB2C}" type="datetimeFigureOut">
               <a:rPr lang="en-US" smtClean="0"/>
-              <a:t>1/22/2019</a:t>
+              <a:t>1/23/2019</a:t>
             </a:fld>
             <a:endParaRPr lang="en-US"/>
           </a:p>
@@ -2263,7 +2268,7 @@
           <a:p>
             <a:fld id="{74AFDC4B-264C-476A-8687-5351AC00FB2C}" type="datetimeFigureOut">
               <a:rPr lang="en-US" smtClean="0"/>
-              <a:t>1/22/2019</a:t>
+              <a:t>1/23/2019</a:t>
             </a:fld>
             <a:endParaRPr lang="en-US"/>
           </a:p>
@@ -2617,7 +2622,7 @@
           <a:p>
             <a:fld id="{74AFDC4B-264C-476A-8687-5351AC00FB2C}" type="datetimeFigureOut">
               <a:rPr lang="en-US" smtClean="0"/>
-              <a:t>1/22/2019</a:t>
+              <a:t>1/23/2019</a:t>
             </a:fld>
             <a:endParaRPr lang="en-US"/>
           </a:p>
@@ -2999,7 +3004,7 @@
           <a:p>
             <a:fld id="{74AFDC4B-264C-476A-8687-5351AC00FB2C}" type="datetimeFigureOut">
               <a:rPr lang="en-US" smtClean="0"/>
-              <a:t>1/22/2019</a:t>
+              <a:t>1/23/2019</a:t>
             </a:fld>
             <a:endParaRPr lang="en-US"/>
           </a:p>
@@ -3286,7 +3291,7 @@
           <a:p>
             <a:fld id="{74AFDC4B-264C-476A-8687-5351AC00FB2C}" type="datetimeFigureOut">
               <a:rPr lang="en-US" smtClean="0"/>
-              <a:t>1/22/2019</a:t>
+              <a:t>1/23/2019</a:t>
             </a:fld>
             <a:endParaRPr lang="en-US"/>
           </a:p>
@@ -4166,15 +4171,19 @@
             </a:pPr>
             <a:r>
               <a:rPr lang="en-US" dirty="0" smtClean="0"/>
-              <a:t>i.e. Digital Forensics Investigators, White Hat Hackers, Casual </a:t>
-            </a:r>
-            <a:r>
-              <a:rPr lang="en-US" dirty="0" err="1" smtClean="0"/>
-              <a:t>Deepweb</a:t>
+              <a:t>i.e. Digital Forensics Investigators, White Hat Hackers, </a:t>
+            </a:r>
+            <a:r>
+              <a:rPr lang="en-US" smtClean="0"/>
+              <a:t>Casual </a:t>
+            </a:r>
+            <a:r>
+              <a:rPr lang="en-US" smtClean="0"/>
+              <a:t>Deep-web </a:t>
             </a:r>
             <a:r>
               <a:rPr lang="en-US" dirty="0" smtClean="0"/>
-              <a:t> Users</a:t>
+              <a:t>Users</a:t>
             </a:r>
             <a:endParaRPr lang="en-US" dirty="0"/>
           </a:p>

</xml_diff>